<commit_message>
Revert "Revert "resized diagrams""
This reverts commit dc134ceb1fa15a603ede70a8bf2d807a6e706676.
</commit_message>
<xml_diff>
--- a/Proiect-Pucani Liviu-Tanul Gabriel.pptx
+++ b/Proiect-Pucani Liviu-Tanul Gabriel.pptx
@@ -351,7 +351,7 @@
           <a:p>
             <a:fld id="{AA70F276-1833-4A75-9C1D-A56E2295A68D}" type="datetimeFigureOut">
               <a:rPr lang="en-US" smtClean="0"/>
-              <a:t>08-Dec-21</a:t>
+              <a:t>12/8/2021</a:t>
             </a:fld>
             <a:endParaRPr lang="en-US"/>
           </a:p>
@@ -788,7 +788,7 @@
             <a:fld id="{AA70F276-1833-4A75-9C1D-A56E2295A68D}" type="datetimeFigureOut">
               <a:rPr lang="en-US" smtClean="0"/>
               <a:pPr/>
-              <a:t>08-Dec-21</a:t>
+              <a:t>12/8/2021</a:t>
             </a:fld>
             <a:endParaRPr lang="en-US" dirty="0"/>
           </a:p>
@@ -1044,7 +1044,7 @@
             <a:fld id="{AA70F276-1833-4A75-9C1D-A56E2295A68D}" type="datetimeFigureOut">
               <a:rPr lang="en-US" smtClean="0"/>
               <a:pPr/>
-              <a:t>08-Dec-21</a:t>
+              <a:t>12/8/2021</a:t>
             </a:fld>
             <a:endParaRPr lang="en-US" dirty="0"/>
           </a:p>
@@ -1358,7 +1358,7 @@
             <a:fld id="{AA70F276-1833-4A75-9C1D-A56E2295A68D}" type="datetimeFigureOut">
               <a:rPr lang="en-US" smtClean="0"/>
               <a:pPr/>
-              <a:t>08-Dec-21</a:t>
+              <a:t>12/8/2021</a:t>
             </a:fld>
             <a:endParaRPr lang="en-US" dirty="0"/>
           </a:p>
@@ -1682,7 +1682,7 @@
             <a:fld id="{AA70F276-1833-4A75-9C1D-A56E2295A68D}" type="datetimeFigureOut">
               <a:rPr lang="en-US" smtClean="0"/>
               <a:pPr/>
-              <a:t>08-Dec-21</a:t>
+              <a:t>12/8/2021</a:t>
             </a:fld>
             <a:endParaRPr lang="en-US" dirty="0"/>
           </a:p>
@@ -1990,7 +1990,7 @@
             <a:fld id="{AA70F276-1833-4A75-9C1D-A56E2295A68D}" type="datetimeFigureOut">
               <a:rPr lang="en-US" smtClean="0"/>
               <a:pPr/>
-              <a:t>08-Dec-21</a:t>
+              <a:t>12/8/2021</a:t>
             </a:fld>
             <a:endParaRPr lang="en-US" dirty="0"/>
           </a:p>
@@ -2363,7 +2363,7 @@
             <a:fld id="{AA70F276-1833-4A75-9C1D-A56E2295A68D}" type="datetimeFigureOut">
               <a:rPr lang="en-US" smtClean="0"/>
               <a:pPr/>
-              <a:t>08-Dec-21</a:t>
+              <a:t>12/8/2021</a:t>
             </a:fld>
             <a:endParaRPr lang="en-US" dirty="0"/>
           </a:p>
@@ -2542,7 +2542,7 @@
           <a:p>
             <a:fld id="{AA70F276-1833-4A75-9C1D-A56E2295A68D}" type="datetimeFigureOut">
               <a:rPr lang="en-US" smtClean="0"/>
-              <a:t>08-Dec-21</a:t>
+              <a:t>12/8/2021</a:t>
             </a:fld>
             <a:endParaRPr lang="en-US"/>
           </a:p>
@@ -2722,7 +2722,7 @@
           <a:p>
             <a:fld id="{AA70F276-1833-4A75-9C1D-A56E2295A68D}" type="datetimeFigureOut">
               <a:rPr lang="en-US" smtClean="0"/>
-              <a:t>08-Dec-21</a:t>
+              <a:t>12/8/2021</a:t>
             </a:fld>
             <a:endParaRPr lang="en-US"/>
           </a:p>
@@ -2892,7 +2892,7 @@
           <a:p>
             <a:fld id="{AA70F276-1833-4A75-9C1D-A56E2295A68D}" type="datetimeFigureOut">
               <a:rPr lang="en-US" smtClean="0"/>
-              <a:t>08-Dec-21</a:t>
+              <a:t>12/8/2021</a:t>
             </a:fld>
             <a:endParaRPr lang="en-US"/>
           </a:p>
@@ -3142,7 +3142,7 @@
           <a:p>
             <a:fld id="{AA70F276-1833-4A75-9C1D-A56E2295A68D}" type="datetimeFigureOut">
               <a:rPr lang="en-US" smtClean="0"/>
-              <a:t>08-Dec-21</a:t>
+              <a:t>12/8/2021</a:t>
             </a:fld>
             <a:endParaRPr lang="en-US"/>
           </a:p>
@@ -3378,7 +3378,7 @@
           <a:p>
             <a:fld id="{AA70F276-1833-4A75-9C1D-A56E2295A68D}" type="datetimeFigureOut">
               <a:rPr lang="en-US" smtClean="0"/>
-              <a:t>08-Dec-21</a:t>
+              <a:t>12/8/2021</a:t>
             </a:fld>
             <a:endParaRPr lang="en-US"/>
           </a:p>
@@ -3760,7 +3760,7 @@
           <a:p>
             <a:fld id="{AA70F276-1833-4A75-9C1D-A56E2295A68D}" type="datetimeFigureOut">
               <a:rPr lang="en-US" smtClean="0"/>
-              <a:t>08-Dec-21</a:t>
+              <a:t>12/8/2021</a:t>
             </a:fld>
             <a:endParaRPr lang="en-US"/>
           </a:p>
@@ -3878,7 +3878,7 @@
           <a:p>
             <a:fld id="{AA70F276-1833-4A75-9C1D-A56E2295A68D}" type="datetimeFigureOut">
               <a:rPr lang="en-US" smtClean="0"/>
-              <a:t>08-Dec-21</a:t>
+              <a:t>12/8/2021</a:t>
             </a:fld>
             <a:endParaRPr lang="en-US"/>
           </a:p>
@@ -3973,7 +3973,7 @@
           <a:p>
             <a:fld id="{AA70F276-1833-4A75-9C1D-A56E2295A68D}" type="datetimeFigureOut">
               <a:rPr lang="en-US" smtClean="0"/>
-              <a:t>08-Dec-21</a:t>
+              <a:t>12/8/2021</a:t>
             </a:fld>
             <a:endParaRPr lang="en-US"/>
           </a:p>
@@ -4228,7 +4228,7 @@
           <a:p>
             <a:fld id="{AA70F276-1833-4A75-9C1D-A56E2295A68D}" type="datetimeFigureOut">
               <a:rPr lang="en-US" smtClean="0"/>
-              <a:t>08-Dec-21</a:t>
+              <a:t>12/8/2021</a:t>
             </a:fld>
             <a:endParaRPr lang="en-US"/>
           </a:p>
@@ -4511,7 +4511,7 @@
           <a:p>
             <a:fld id="{AA70F276-1833-4A75-9C1D-A56E2295A68D}" type="datetimeFigureOut">
               <a:rPr lang="en-US" smtClean="0"/>
-              <a:t>08-Dec-21</a:t>
+              <a:t>12/8/2021</a:t>
             </a:fld>
             <a:endParaRPr lang="en-US"/>
           </a:p>
@@ -4918,7 +4918,7 @@
             <a:fld id="{AA70F276-1833-4A75-9C1D-A56E2295A68D}" type="datetimeFigureOut">
               <a:rPr lang="en-US" smtClean="0"/>
               <a:pPr/>
-              <a:t>08-Dec-21</a:t>
+              <a:t>12/8/2021</a:t>
             </a:fld>
             <a:endParaRPr lang="en-US" dirty="0"/>
           </a:p>
@@ -6157,8 +6157,8 @@
         </p:blipFill>
         <p:spPr>
           <a:xfrm>
-            <a:off x="2958308" y="1366684"/>
-            <a:ext cx="6275383" cy="5344158"/>
+            <a:off x="3370708" y="1366684"/>
+            <a:ext cx="5450585" cy="5344158"/>
           </a:xfrm>
           <a:prstGeom prst="rect">
             <a:avLst/>
@@ -6462,8 +6462,8 @@
         </p:blipFill>
         <p:spPr>
           <a:xfrm>
-            <a:off x="2967315" y="1426572"/>
-            <a:ext cx="6257370" cy="5284270"/>
+            <a:off x="3594846" y="1363819"/>
+            <a:ext cx="5002308" cy="5284270"/>
           </a:xfrm>
           <a:prstGeom prst="rect">
             <a:avLst/>
@@ -13279,8 +13279,8 @@
         </p:blipFill>
         <p:spPr>
           <a:xfrm>
-            <a:off x="3012597" y="1332971"/>
-            <a:ext cx="6166805" cy="5377871"/>
+            <a:off x="3563699" y="1332971"/>
+            <a:ext cx="5064602" cy="5377871"/>
           </a:xfrm>
           <a:prstGeom prst="rect">
             <a:avLst/>

</xml_diff>